<commit_message>
Update userguide diagram and delete command message
</commit_message>
<xml_diff>
--- a/docs/diagrams/HighLevelSequenceDiagrams.pptx
+++ b/docs/diagrams/HighLevelSequenceDiagrams.pptx
@@ -107,7 +107,27 @@
       </a:defRPr>
     </a:lvl9pPr>
   </p:defaultTextStyle>
+  <p:extLst>
+    <p:ext uri="{EFAFB233-063F-42B5-8137-9DF3F51BA10A}">
+      <p15:sldGuideLst xmlns:p15="http://schemas.microsoft.com/office/powerpoint/2012/main">
+        <p15:guide id="1" orient="horz" pos="1488">
+          <p15:clr>
+            <a:srgbClr val="A4A3A4"/>
+          </p15:clr>
+        </p15:guide>
+        <p15:guide id="2" pos="2880">
+          <p15:clr>
+            <a:srgbClr val="A4A3A4"/>
+          </p15:clr>
+        </p15:guide>
+      </p15:sldGuideLst>
+    </p:ext>
+  </p:extLst>
 </p:presentation>
+</file>
+
+<file path=ppt/revisionInfo.xml><?xml version="1.0" encoding="utf-8"?>
+<p1510:revInfo xmlns:a="http://schemas.openxmlformats.org/drawingml/2006/main" xmlns:r="http://schemas.openxmlformats.org/officeDocument/2006/relationships" xmlns:p1510="http://schemas.microsoft.com/office/powerpoint/2015/10/main"/>
 </file>
 
 <file path=ppt/notesMasters/notesMaster1.xml><?xml version="1.0" encoding="utf-8"?>
@@ -192,7 +212,7 @@
           <a:p>
             <a:fld id="{F5CC4B3F-88C1-4FFA-B1B6-F41C21DC6924}" type="datetimeFigureOut">
               <a:rPr lang="en-US" smtClean="0"/>
-              <a:t>10/16/2016</a:t>
+              <a:t>7/21/2017</a:t>
             </a:fld>
             <a:endParaRPr lang="en-US"/>
           </a:p>
@@ -256,38 +276,37 @@
           <a:p>
             <a:pPr lvl="0"/>
             <a:r>
-              <a:rPr lang="en-US" smtClean="0"/>
+              <a:rPr lang="en-US"/>
               <a:t>Click to edit Master text styles</a:t>
             </a:r>
           </a:p>
           <a:p>
             <a:pPr lvl="1"/>
             <a:r>
-              <a:rPr lang="en-US" smtClean="0"/>
+              <a:rPr lang="en-US"/>
               <a:t>Second level</a:t>
             </a:r>
           </a:p>
           <a:p>
             <a:pPr lvl="2"/>
             <a:r>
-              <a:rPr lang="en-US" smtClean="0"/>
+              <a:rPr lang="en-US"/>
               <a:t>Third level</a:t>
             </a:r>
           </a:p>
           <a:p>
             <a:pPr lvl="3"/>
             <a:r>
-              <a:rPr lang="en-US" smtClean="0"/>
+              <a:rPr lang="en-US"/>
               <a:t>Fourth level</a:t>
             </a:r>
           </a:p>
           <a:p>
             <a:pPr lvl="4"/>
             <a:r>
-              <a:rPr lang="en-US" smtClean="0"/>
+              <a:rPr lang="en-US"/>
               <a:t>Fifth level</a:t>
             </a:r>
-            <a:endParaRPr lang="en-US"/>
           </a:p>
         </p:txBody>
       </p:sp>
@@ -498,10 +517,9 @@
           <a:lstStyle/>
           <a:p>
             <a:r>
-              <a:rPr lang="en-US" smtClean="0"/>
+              <a:rPr lang="en-US"/>
               <a:t>Click to edit Master title style</a:t>
             </a:r>
-            <a:endParaRPr lang="en-US"/>
           </a:p>
         </p:txBody>
       </p:sp>
@@ -617,10 +635,9 @@
           </a:lstStyle>
           <a:p>
             <a:r>
-              <a:rPr lang="en-US" smtClean="0"/>
+              <a:rPr lang="en-US"/>
               <a:t>Click to edit Master subtitle style</a:t>
             </a:r>
-            <a:endParaRPr lang="en-US"/>
           </a:p>
         </p:txBody>
       </p:sp>
@@ -641,7 +658,7 @@
           <a:p>
             <a:fld id="{78C97017-6FC3-485B-9764-EAC9E56C1D49}" type="datetimeFigureOut">
               <a:rPr lang="en-US" smtClean="0"/>
-              <a:t>10/16/2016</a:t>
+              <a:t>7/21/2017</a:t>
             </a:fld>
             <a:endParaRPr lang="en-US"/>
           </a:p>
@@ -735,10 +752,9 @@
           <a:lstStyle/>
           <a:p>
             <a:r>
-              <a:rPr lang="en-US" smtClean="0"/>
+              <a:rPr lang="en-US"/>
               <a:t>Click to edit Master title style</a:t>
             </a:r>
-            <a:endParaRPr lang="en-US"/>
           </a:p>
         </p:txBody>
       </p:sp>
@@ -759,38 +775,37 @@
           <a:p>
             <a:pPr lvl="0"/>
             <a:r>
-              <a:rPr lang="en-US" smtClean="0"/>
+              <a:rPr lang="en-US"/>
               <a:t>Click to edit Master text styles</a:t>
             </a:r>
           </a:p>
           <a:p>
             <a:pPr lvl="1"/>
             <a:r>
-              <a:rPr lang="en-US" smtClean="0"/>
+              <a:rPr lang="en-US"/>
               <a:t>Second level</a:t>
             </a:r>
           </a:p>
           <a:p>
             <a:pPr lvl="2"/>
             <a:r>
-              <a:rPr lang="en-US" smtClean="0"/>
+              <a:rPr lang="en-US"/>
               <a:t>Third level</a:t>
             </a:r>
           </a:p>
           <a:p>
             <a:pPr lvl="3"/>
             <a:r>
-              <a:rPr lang="en-US" smtClean="0"/>
+              <a:rPr lang="en-US"/>
               <a:t>Fourth level</a:t>
             </a:r>
           </a:p>
           <a:p>
             <a:pPr lvl="4"/>
             <a:r>
-              <a:rPr lang="en-US" smtClean="0"/>
+              <a:rPr lang="en-US"/>
               <a:t>Fifth level</a:t>
             </a:r>
-            <a:endParaRPr lang="en-US"/>
           </a:p>
         </p:txBody>
       </p:sp>
@@ -811,7 +826,7 @@
           <a:p>
             <a:fld id="{78C97017-6FC3-485B-9764-EAC9E56C1D49}" type="datetimeFigureOut">
               <a:rPr lang="en-US" smtClean="0"/>
-              <a:t>10/16/2016</a:t>
+              <a:t>7/21/2017</a:t>
             </a:fld>
             <a:endParaRPr lang="en-US"/>
           </a:p>
@@ -910,10 +925,9 @@
           <a:lstStyle/>
           <a:p>
             <a:r>
-              <a:rPr lang="en-US" smtClean="0"/>
+              <a:rPr lang="en-US"/>
               <a:t>Click to edit Master title style</a:t>
             </a:r>
-            <a:endParaRPr lang="en-US"/>
           </a:p>
         </p:txBody>
       </p:sp>
@@ -939,38 +953,37 @@
           <a:p>
             <a:pPr lvl="0"/>
             <a:r>
-              <a:rPr lang="en-US" smtClean="0"/>
+              <a:rPr lang="en-US"/>
               <a:t>Click to edit Master text styles</a:t>
             </a:r>
           </a:p>
           <a:p>
             <a:pPr lvl="1"/>
             <a:r>
-              <a:rPr lang="en-US" smtClean="0"/>
+              <a:rPr lang="en-US"/>
               <a:t>Second level</a:t>
             </a:r>
           </a:p>
           <a:p>
             <a:pPr lvl="2"/>
             <a:r>
-              <a:rPr lang="en-US" smtClean="0"/>
+              <a:rPr lang="en-US"/>
               <a:t>Third level</a:t>
             </a:r>
           </a:p>
           <a:p>
             <a:pPr lvl="3"/>
             <a:r>
-              <a:rPr lang="en-US" smtClean="0"/>
+              <a:rPr lang="en-US"/>
               <a:t>Fourth level</a:t>
             </a:r>
           </a:p>
           <a:p>
             <a:pPr lvl="4"/>
             <a:r>
-              <a:rPr lang="en-US" smtClean="0"/>
+              <a:rPr lang="en-US"/>
               <a:t>Fifth level</a:t>
             </a:r>
-            <a:endParaRPr lang="en-US"/>
           </a:p>
         </p:txBody>
       </p:sp>
@@ -991,7 +1004,7 @@
           <a:p>
             <a:fld id="{78C97017-6FC3-485B-9764-EAC9E56C1D49}" type="datetimeFigureOut">
               <a:rPr lang="en-US" smtClean="0"/>
-              <a:t>10/16/2016</a:t>
+              <a:t>7/21/2017</a:t>
             </a:fld>
             <a:endParaRPr lang="en-US"/>
           </a:p>
@@ -1085,10 +1098,9 @@
           <a:lstStyle/>
           <a:p>
             <a:r>
-              <a:rPr lang="en-US" smtClean="0"/>
+              <a:rPr lang="en-US"/>
               <a:t>Click to edit Master title style</a:t>
             </a:r>
-            <a:endParaRPr lang="en-US"/>
           </a:p>
         </p:txBody>
       </p:sp>
@@ -1109,38 +1121,37 @@
           <a:p>
             <a:pPr lvl="0"/>
             <a:r>
-              <a:rPr lang="en-US" smtClean="0"/>
+              <a:rPr lang="en-US"/>
               <a:t>Click to edit Master text styles</a:t>
             </a:r>
           </a:p>
           <a:p>
             <a:pPr lvl="1"/>
             <a:r>
-              <a:rPr lang="en-US" smtClean="0"/>
+              <a:rPr lang="en-US"/>
               <a:t>Second level</a:t>
             </a:r>
           </a:p>
           <a:p>
             <a:pPr lvl="2"/>
             <a:r>
-              <a:rPr lang="en-US" smtClean="0"/>
+              <a:rPr lang="en-US"/>
               <a:t>Third level</a:t>
             </a:r>
           </a:p>
           <a:p>
             <a:pPr lvl="3"/>
             <a:r>
-              <a:rPr lang="en-US" smtClean="0"/>
+              <a:rPr lang="en-US"/>
               <a:t>Fourth level</a:t>
             </a:r>
           </a:p>
           <a:p>
             <a:pPr lvl="4"/>
             <a:r>
-              <a:rPr lang="en-US" smtClean="0"/>
+              <a:rPr lang="en-US"/>
               <a:t>Fifth level</a:t>
             </a:r>
-            <a:endParaRPr lang="en-US"/>
           </a:p>
         </p:txBody>
       </p:sp>
@@ -1161,7 +1172,7 @@
           <a:p>
             <a:fld id="{78C97017-6FC3-485B-9764-EAC9E56C1D49}" type="datetimeFigureOut">
               <a:rPr lang="en-US" smtClean="0"/>
-              <a:t>10/16/2016</a:t>
+              <a:t>7/21/2017</a:t>
             </a:fld>
             <a:endParaRPr lang="en-US"/>
           </a:p>
@@ -1264,10 +1275,9 @@
           </a:lstStyle>
           <a:p>
             <a:r>
-              <a:rPr lang="en-US" smtClean="0"/>
+              <a:rPr lang="en-US"/>
               <a:t>Click to edit Master title style</a:t>
             </a:r>
-            <a:endParaRPr lang="en-US"/>
           </a:p>
         </p:txBody>
       </p:sp>
@@ -1384,7 +1394,7 @@
           <a:p>
             <a:pPr lvl="0"/>
             <a:r>
-              <a:rPr lang="en-US" smtClean="0"/>
+              <a:rPr lang="en-US"/>
               <a:t>Click to edit Master text styles</a:t>
             </a:r>
           </a:p>
@@ -1407,7 +1417,7 @@
           <a:p>
             <a:fld id="{78C97017-6FC3-485B-9764-EAC9E56C1D49}" type="datetimeFigureOut">
               <a:rPr lang="en-US" smtClean="0"/>
-              <a:t>10/16/2016</a:t>
+              <a:t>7/21/2017</a:t>
             </a:fld>
             <a:endParaRPr lang="en-US"/>
           </a:p>
@@ -1501,10 +1511,9 @@
           <a:lstStyle/>
           <a:p>
             <a:r>
-              <a:rPr lang="en-US" smtClean="0"/>
+              <a:rPr lang="en-US"/>
               <a:t>Click to edit Master title style</a:t>
             </a:r>
-            <a:endParaRPr lang="en-US"/>
           </a:p>
         </p:txBody>
       </p:sp>
@@ -1558,38 +1567,37 @@
           <a:p>
             <a:pPr lvl="0"/>
             <a:r>
-              <a:rPr lang="en-US" smtClean="0"/>
+              <a:rPr lang="en-US"/>
               <a:t>Click to edit Master text styles</a:t>
             </a:r>
           </a:p>
           <a:p>
             <a:pPr lvl="1"/>
             <a:r>
-              <a:rPr lang="en-US" smtClean="0"/>
+              <a:rPr lang="en-US"/>
               <a:t>Second level</a:t>
             </a:r>
           </a:p>
           <a:p>
             <a:pPr lvl="2"/>
             <a:r>
-              <a:rPr lang="en-US" smtClean="0"/>
+              <a:rPr lang="en-US"/>
               <a:t>Third level</a:t>
             </a:r>
           </a:p>
           <a:p>
             <a:pPr lvl="3"/>
             <a:r>
-              <a:rPr lang="en-US" smtClean="0"/>
+              <a:rPr lang="en-US"/>
               <a:t>Fourth level</a:t>
             </a:r>
           </a:p>
           <a:p>
             <a:pPr lvl="4"/>
             <a:r>
-              <a:rPr lang="en-US" smtClean="0"/>
+              <a:rPr lang="en-US"/>
               <a:t>Fifth level</a:t>
             </a:r>
-            <a:endParaRPr lang="en-US"/>
           </a:p>
         </p:txBody>
       </p:sp>
@@ -1643,38 +1651,37 @@
           <a:p>
             <a:pPr lvl="0"/>
             <a:r>
-              <a:rPr lang="en-US" smtClean="0"/>
+              <a:rPr lang="en-US"/>
               <a:t>Click to edit Master text styles</a:t>
             </a:r>
           </a:p>
           <a:p>
             <a:pPr lvl="1"/>
             <a:r>
-              <a:rPr lang="en-US" smtClean="0"/>
+              <a:rPr lang="en-US"/>
               <a:t>Second level</a:t>
             </a:r>
           </a:p>
           <a:p>
             <a:pPr lvl="2"/>
             <a:r>
-              <a:rPr lang="en-US" smtClean="0"/>
+              <a:rPr lang="en-US"/>
               <a:t>Third level</a:t>
             </a:r>
           </a:p>
           <a:p>
             <a:pPr lvl="3"/>
             <a:r>
-              <a:rPr lang="en-US" smtClean="0"/>
+              <a:rPr lang="en-US"/>
               <a:t>Fourth level</a:t>
             </a:r>
           </a:p>
           <a:p>
             <a:pPr lvl="4"/>
             <a:r>
-              <a:rPr lang="en-US" smtClean="0"/>
+              <a:rPr lang="en-US"/>
               <a:t>Fifth level</a:t>
             </a:r>
-            <a:endParaRPr lang="en-US"/>
           </a:p>
         </p:txBody>
       </p:sp>
@@ -1695,7 +1702,7 @@
           <a:p>
             <a:fld id="{78C97017-6FC3-485B-9764-EAC9E56C1D49}" type="datetimeFigureOut">
               <a:rPr lang="en-US" smtClean="0"/>
-              <a:t>10/16/2016</a:t>
+              <a:t>7/21/2017</a:t>
             </a:fld>
             <a:endParaRPr lang="en-US"/>
           </a:p>
@@ -1793,10 +1800,9 @@
           </a:lstStyle>
           <a:p>
             <a:r>
-              <a:rPr lang="en-US" smtClean="0"/>
+              <a:rPr lang="en-US"/>
               <a:t>Click to edit Master title style</a:t>
             </a:r>
-            <a:endParaRPr lang="en-US"/>
           </a:p>
         </p:txBody>
       </p:sp>
@@ -1859,7 +1865,7 @@
           <a:p>
             <a:pPr lvl="0"/>
             <a:r>
-              <a:rPr lang="en-US" smtClean="0"/>
+              <a:rPr lang="en-US"/>
               <a:t>Click to edit Master text styles</a:t>
             </a:r>
           </a:p>
@@ -1915,38 +1921,37 @@
           <a:p>
             <a:pPr lvl="0"/>
             <a:r>
-              <a:rPr lang="en-US" smtClean="0"/>
+              <a:rPr lang="en-US"/>
               <a:t>Click to edit Master text styles</a:t>
             </a:r>
           </a:p>
           <a:p>
             <a:pPr lvl="1"/>
             <a:r>
-              <a:rPr lang="en-US" smtClean="0"/>
+              <a:rPr lang="en-US"/>
               <a:t>Second level</a:t>
             </a:r>
           </a:p>
           <a:p>
             <a:pPr lvl="2"/>
             <a:r>
-              <a:rPr lang="en-US" smtClean="0"/>
+              <a:rPr lang="en-US"/>
               <a:t>Third level</a:t>
             </a:r>
           </a:p>
           <a:p>
             <a:pPr lvl="3"/>
             <a:r>
-              <a:rPr lang="en-US" smtClean="0"/>
+              <a:rPr lang="en-US"/>
               <a:t>Fourth level</a:t>
             </a:r>
           </a:p>
           <a:p>
             <a:pPr lvl="4"/>
             <a:r>
-              <a:rPr lang="en-US" smtClean="0"/>
+              <a:rPr lang="en-US"/>
               <a:t>Fifth level</a:t>
             </a:r>
-            <a:endParaRPr lang="en-US"/>
           </a:p>
         </p:txBody>
       </p:sp>
@@ -2009,7 +2014,7 @@
           <a:p>
             <a:pPr lvl="0"/>
             <a:r>
-              <a:rPr lang="en-US" smtClean="0"/>
+              <a:rPr lang="en-US"/>
               <a:t>Click to edit Master text styles</a:t>
             </a:r>
           </a:p>
@@ -2065,38 +2070,37 @@
           <a:p>
             <a:pPr lvl="0"/>
             <a:r>
-              <a:rPr lang="en-US" smtClean="0"/>
+              <a:rPr lang="en-US"/>
               <a:t>Click to edit Master text styles</a:t>
             </a:r>
           </a:p>
           <a:p>
             <a:pPr lvl="1"/>
             <a:r>
-              <a:rPr lang="en-US" smtClean="0"/>
+              <a:rPr lang="en-US"/>
               <a:t>Second level</a:t>
             </a:r>
           </a:p>
           <a:p>
             <a:pPr lvl="2"/>
             <a:r>
-              <a:rPr lang="en-US" smtClean="0"/>
+              <a:rPr lang="en-US"/>
               <a:t>Third level</a:t>
             </a:r>
           </a:p>
           <a:p>
             <a:pPr lvl="3"/>
             <a:r>
-              <a:rPr lang="en-US" smtClean="0"/>
+              <a:rPr lang="en-US"/>
               <a:t>Fourth level</a:t>
             </a:r>
           </a:p>
           <a:p>
             <a:pPr lvl="4"/>
             <a:r>
-              <a:rPr lang="en-US" smtClean="0"/>
+              <a:rPr lang="en-US"/>
               <a:t>Fifth level</a:t>
             </a:r>
-            <a:endParaRPr lang="en-US"/>
           </a:p>
         </p:txBody>
       </p:sp>
@@ -2117,7 +2121,7 @@
           <a:p>
             <a:fld id="{78C97017-6FC3-485B-9764-EAC9E56C1D49}" type="datetimeFigureOut">
               <a:rPr lang="en-US" smtClean="0"/>
-              <a:t>10/16/2016</a:t>
+              <a:t>7/21/2017</a:t>
             </a:fld>
             <a:endParaRPr lang="en-US"/>
           </a:p>
@@ -2211,10 +2215,9 @@
           <a:lstStyle/>
           <a:p>
             <a:r>
-              <a:rPr lang="en-US" smtClean="0"/>
+              <a:rPr lang="en-US"/>
               <a:t>Click to edit Master title style</a:t>
             </a:r>
-            <a:endParaRPr lang="en-US"/>
           </a:p>
         </p:txBody>
       </p:sp>
@@ -2235,7 +2238,7 @@
           <a:p>
             <a:fld id="{78C97017-6FC3-485B-9764-EAC9E56C1D49}" type="datetimeFigureOut">
               <a:rPr lang="en-US" smtClean="0"/>
-              <a:t>10/16/2016</a:t>
+              <a:t>7/21/2017</a:t>
             </a:fld>
             <a:endParaRPr lang="en-US"/>
           </a:p>
@@ -2330,7 +2333,7 @@
           <a:p>
             <a:fld id="{78C97017-6FC3-485B-9764-EAC9E56C1D49}" type="datetimeFigureOut">
               <a:rPr lang="en-US" smtClean="0"/>
-              <a:t>10/16/2016</a:t>
+              <a:t>7/21/2017</a:t>
             </a:fld>
             <a:endParaRPr lang="en-US"/>
           </a:p>
@@ -2433,10 +2436,9 @@
           </a:lstStyle>
           <a:p>
             <a:r>
-              <a:rPr lang="en-US" smtClean="0"/>
+              <a:rPr lang="en-US"/>
               <a:t>Click to edit Master title style</a:t>
             </a:r>
-            <a:endParaRPr lang="en-US"/>
           </a:p>
         </p:txBody>
       </p:sp>
@@ -2490,38 +2492,37 @@
           <a:p>
             <a:pPr lvl="0"/>
             <a:r>
-              <a:rPr lang="en-US" smtClean="0"/>
+              <a:rPr lang="en-US"/>
               <a:t>Click to edit Master text styles</a:t>
             </a:r>
           </a:p>
           <a:p>
             <a:pPr lvl="1"/>
             <a:r>
-              <a:rPr lang="en-US" smtClean="0"/>
+              <a:rPr lang="en-US"/>
               <a:t>Second level</a:t>
             </a:r>
           </a:p>
           <a:p>
             <a:pPr lvl="2"/>
             <a:r>
-              <a:rPr lang="en-US" smtClean="0"/>
+              <a:rPr lang="en-US"/>
               <a:t>Third level</a:t>
             </a:r>
           </a:p>
           <a:p>
             <a:pPr lvl="3"/>
             <a:r>
-              <a:rPr lang="en-US" smtClean="0"/>
+              <a:rPr lang="en-US"/>
               <a:t>Fourth level</a:t>
             </a:r>
           </a:p>
           <a:p>
             <a:pPr lvl="4"/>
             <a:r>
-              <a:rPr lang="en-US" smtClean="0"/>
+              <a:rPr lang="en-US"/>
               <a:t>Fifth level</a:t>
             </a:r>
-            <a:endParaRPr lang="en-US"/>
           </a:p>
         </p:txBody>
       </p:sp>
@@ -2584,7 +2585,7 @@
           <a:p>
             <a:pPr lvl="0"/>
             <a:r>
-              <a:rPr lang="en-US" smtClean="0"/>
+              <a:rPr lang="en-US"/>
               <a:t>Click to edit Master text styles</a:t>
             </a:r>
           </a:p>
@@ -2607,7 +2608,7 @@
           <a:p>
             <a:fld id="{78C97017-6FC3-485B-9764-EAC9E56C1D49}" type="datetimeFigureOut">
               <a:rPr lang="en-US" smtClean="0"/>
-              <a:t>10/16/2016</a:t>
+              <a:t>7/21/2017</a:t>
             </a:fld>
             <a:endParaRPr lang="en-US"/>
           </a:p>
@@ -2710,10 +2711,9 @@
           </a:lstStyle>
           <a:p>
             <a:r>
-              <a:rPr lang="en-US" smtClean="0"/>
+              <a:rPr lang="en-US"/>
               <a:t>Click to edit Master title style</a:t>
             </a:r>
-            <a:endParaRPr lang="en-US"/>
           </a:p>
         </p:txBody>
       </p:sp>
@@ -2837,7 +2837,7 @@
           <a:p>
             <a:pPr lvl="0"/>
             <a:r>
-              <a:rPr lang="en-US" smtClean="0"/>
+              <a:rPr lang="en-US"/>
               <a:t>Click to edit Master text styles</a:t>
             </a:r>
           </a:p>
@@ -2860,7 +2860,7 @@
           <a:p>
             <a:fld id="{78C97017-6FC3-485B-9764-EAC9E56C1D49}" type="datetimeFigureOut">
               <a:rPr lang="en-US" smtClean="0"/>
-              <a:t>10/16/2016</a:t>
+              <a:t>7/21/2017</a:t>
             </a:fld>
             <a:endParaRPr lang="en-US"/>
           </a:p>
@@ -2969,10 +2969,9 @@
           <a:lstStyle/>
           <a:p>
             <a:r>
-              <a:rPr lang="en-US" smtClean="0"/>
+              <a:rPr lang="en-US"/>
               <a:t>Click to edit Master title style</a:t>
             </a:r>
-            <a:endParaRPr lang="en-US"/>
           </a:p>
         </p:txBody>
       </p:sp>
@@ -3003,38 +3002,37 @@
           <a:p>
             <a:pPr lvl="0"/>
             <a:r>
-              <a:rPr lang="en-US" smtClean="0"/>
+              <a:rPr lang="en-US"/>
               <a:t>Click to edit Master text styles</a:t>
             </a:r>
           </a:p>
           <a:p>
             <a:pPr lvl="1"/>
             <a:r>
-              <a:rPr lang="en-US" smtClean="0"/>
+              <a:rPr lang="en-US"/>
               <a:t>Second level</a:t>
             </a:r>
           </a:p>
           <a:p>
             <a:pPr lvl="2"/>
             <a:r>
-              <a:rPr lang="en-US" smtClean="0"/>
+              <a:rPr lang="en-US"/>
               <a:t>Third level</a:t>
             </a:r>
           </a:p>
           <a:p>
             <a:pPr lvl="3"/>
             <a:r>
-              <a:rPr lang="en-US" smtClean="0"/>
+              <a:rPr lang="en-US"/>
               <a:t>Fourth level</a:t>
             </a:r>
           </a:p>
           <a:p>
             <a:pPr lvl="4"/>
             <a:r>
-              <a:rPr lang="en-US" smtClean="0"/>
+              <a:rPr lang="en-US"/>
               <a:t>Fifth level</a:t>
             </a:r>
-            <a:endParaRPr lang="en-US"/>
           </a:p>
         </p:txBody>
       </p:sp>
@@ -3073,7 +3071,7 @@
           <a:p>
             <a:fld id="{78C97017-6FC3-485B-9764-EAC9E56C1D49}" type="datetimeFigureOut">
               <a:rPr lang="en-US" smtClean="0"/>
-              <a:t>10/16/2016</a:t>
+              <a:t>7/21/2017</a:t>
             </a:fld>
             <a:endParaRPr lang="en-US"/>
           </a:p>
@@ -3492,7 +3490,7 @@
           <a:p>
             <a:pPr algn="ctr"/>
             <a:r>
-              <a:rPr lang="en-US" sz="1600" dirty="0" smtClean="0">
+              <a:rPr lang="en-US" sz="1600" dirty="0">
                 <a:solidFill>
                   <a:schemeClr val="bg1"/>
                 </a:solidFill>
@@ -3595,223 +3593,6 @@
           </a:p>
         </p:txBody>
       </p:sp>
-      <p:grpSp>
-        <p:nvGrpSpPr>
-          <p:cNvPr id="7" name="Actor"/>
-          <p:cNvGrpSpPr/>
-          <p:nvPr/>
-        </p:nvGrpSpPr>
-        <p:grpSpPr>
-          <a:xfrm>
-            <a:off x="152400" y="533400"/>
-            <a:ext cx="324036" cy="573410"/>
-            <a:chOff x="3239901" y="4149080"/>
-            <a:chExt cx="648072" cy="1146820"/>
-          </a:xfrm>
-        </p:grpSpPr>
-        <p:sp>
-          <p:nvSpPr>
-            <p:cNvPr id="8" name="Flowchart: Connector 7"/>
-            <p:cNvSpPr/>
-            <p:nvPr/>
-          </p:nvSpPr>
-          <p:spPr>
-            <a:xfrm>
-              <a:off x="3419872" y="4149080"/>
-              <a:ext cx="288032" cy="288032"/>
-            </a:xfrm>
-            <a:prstGeom prst="flowChartConnector">
-              <a:avLst/>
-            </a:prstGeom>
-            <a:solidFill>
-              <a:schemeClr val="bg1">
-                <a:lumMod val="85000"/>
-              </a:schemeClr>
-            </a:solidFill>
-            <a:ln w="28575">
-              <a:solidFill>
-                <a:schemeClr val="tx1"/>
-              </a:solidFill>
-            </a:ln>
-            <a:effectLst/>
-          </p:spPr>
-          <p:style>
-            <a:lnRef idx="1">
-              <a:schemeClr val="accent4"/>
-            </a:lnRef>
-            <a:fillRef idx="2">
-              <a:schemeClr val="accent4"/>
-            </a:fillRef>
-            <a:effectRef idx="1">
-              <a:schemeClr val="accent4"/>
-            </a:effectRef>
-            <a:fontRef idx="minor">
-              <a:schemeClr val="dk1"/>
-            </a:fontRef>
-          </p:style>
-          <p:txBody>
-            <a:bodyPr rtlCol="0" anchor="ctr"/>
-            <a:lstStyle/>
-            <a:p>
-              <a:pPr algn="ctr"/>
-              <a:endParaRPr lang="en-SG"/>
-            </a:p>
-          </p:txBody>
-        </p:sp>
-        <p:cxnSp>
-          <p:nvCxnSpPr>
-            <p:cNvPr id="9" name="Straight Connector 8"/>
-            <p:cNvCxnSpPr>
-              <a:stCxn id="8" idx="4"/>
-            </p:cNvCxnSpPr>
-            <p:nvPr/>
-          </p:nvCxnSpPr>
-          <p:spPr>
-            <a:xfrm>
-              <a:off x="3563888" y="4437112"/>
-              <a:ext cx="0" cy="504056"/>
-            </a:xfrm>
-            <a:prstGeom prst="line">
-              <a:avLst/>
-            </a:prstGeom>
-            <a:ln w="28575">
-              <a:solidFill>
-                <a:schemeClr val="tx1"/>
-              </a:solidFill>
-            </a:ln>
-            <a:effectLst/>
-          </p:spPr>
-          <p:style>
-            <a:lnRef idx="1">
-              <a:schemeClr val="accent4"/>
-            </a:lnRef>
-            <a:fillRef idx="2">
-              <a:schemeClr val="accent4"/>
-            </a:fillRef>
-            <a:effectRef idx="1">
-              <a:schemeClr val="accent4"/>
-            </a:effectRef>
-            <a:fontRef idx="minor">
-              <a:schemeClr val="dk1"/>
-            </a:fontRef>
-          </p:style>
-        </p:cxnSp>
-        <p:sp>
-          <p:nvSpPr>
-            <p:cNvPr id="10" name="Freeform 9"/>
-            <p:cNvSpPr/>
-            <p:nvPr/>
-          </p:nvSpPr>
-          <p:spPr>
-            <a:xfrm>
-              <a:off x="3324225" y="4933950"/>
-              <a:ext cx="479425" cy="361950"/>
-            </a:xfrm>
-            <a:custGeom>
-              <a:avLst/>
-              <a:gdLst>
-                <a:gd name="connsiteX0" fmla="*/ 0 w 479425"/>
-                <a:gd name="connsiteY0" fmla="*/ 355600 h 361950"/>
-                <a:gd name="connsiteX1" fmla="*/ 241300 w 479425"/>
-                <a:gd name="connsiteY1" fmla="*/ 0 h 361950"/>
-                <a:gd name="connsiteX2" fmla="*/ 479425 w 479425"/>
-                <a:gd name="connsiteY2" fmla="*/ 361950 h 361950"/>
-              </a:gdLst>
-              <a:ahLst/>
-              <a:cxnLst>
-                <a:cxn ang="0">
-                  <a:pos x="connsiteX0" y="connsiteY0"/>
-                </a:cxn>
-                <a:cxn ang="0">
-                  <a:pos x="connsiteX1" y="connsiteY1"/>
-                </a:cxn>
-                <a:cxn ang="0">
-                  <a:pos x="connsiteX2" y="connsiteY2"/>
-                </a:cxn>
-              </a:cxnLst>
-              <a:rect l="l" t="t" r="r" b="b"/>
-              <a:pathLst>
-                <a:path w="479425" h="361950">
-                  <a:moveTo>
-                    <a:pt x="0" y="355600"/>
-                  </a:moveTo>
-                  <a:lnTo>
-                    <a:pt x="241300" y="0"/>
-                  </a:lnTo>
-                  <a:lnTo>
-                    <a:pt x="479425" y="361950"/>
-                  </a:lnTo>
-                </a:path>
-              </a:pathLst>
-            </a:custGeom>
-            <a:noFill/>
-            <a:ln w="28575">
-              <a:solidFill>
-                <a:schemeClr val="tx1"/>
-              </a:solidFill>
-            </a:ln>
-            <a:effectLst/>
-          </p:spPr>
-          <p:style>
-            <a:lnRef idx="1">
-              <a:schemeClr val="accent4"/>
-            </a:lnRef>
-            <a:fillRef idx="2">
-              <a:schemeClr val="accent4"/>
-            </a:fillRef>
-            <a:effectRef idx="1">
-              <a:schemeClr val="accent4"/>
-            </a:effectRef>
-            <a:fontRef idx="minor">
-              <a:schemeClr val="dk1"/>
-            </a:fontRef>
-          </p:style>
-          <p:txBody>
-            <a:bodyPr rtlCol="0" anchor="ctr"/>
-            <a:lstStyle/>
-            <a:p>
-              <a:pPr algn="ctr"/>
-              <a:endParaRPr lang="en-SG"/>
-            </a:p>
-          </p:txBody>
-        </p:sp>
-        <p:cxnSp>
-          <p:nvCxnSpPr>
-            <p:cNvPr id="11" name="Straight Connector 10"/>
-            <p:cNvCxnSpPr/>
-            <p:nvPr/>
-          </p:nvCxnSpPr>
-          <p:spPr>
-            <a:xfrm>
-              <a:off x="3239901" y="4509120"/>
-              <a:ext cx="648072" cy="0"/>
-            </a:xfrm>
-            <a:prstGeom prst="line">
-              <a:avLst/>
-            </a:prstGeom>
-            <a:ln w="28575">
-              <a:solidFill>
-                <a:schemeClr val="tx1"/>
-              </a:solidFill>
-            </a:ln>
-            <a:effectLst/>
-          </p:spPr>
-          <p:style>
-            <a:lnRef idx="1">
-              <a:schemeClr val="accent4"/>
-            </a:lnRef>
-            <a:fillRef idx="2">
-              <a:schemeClr val="accent4"/>
-            </a:fillRef>
-            <a:effectRef idx="1">
-              <a:schemeClr val="accent4"/>
-            </a:effectRef>
-            <a:fontRef idx="minor">
-              <a:schemeClr val="dk1"/>
-            </a:fontRef>
-          </p:style>
-        </p:cxnSp>
-      </p:grpSp>
       <p:sp>
         <p:nvSpPr>
           <p:cNvPr id="16" name="Rectangle 62"/>
@@ -3856,7 +3637,7 @@
           <a:p>
             <a:pPr algn="ctr"/>
             <a:r>
-              <a:rPr lang="en-US" sz="1600" dirty="0" smtClean="0">
+              <a:rPr lang="en-US" sz="1600" dirty="0">
                 <a:solidFill>
                   <a:schemeClr val="bg1"/>
                 </a:solidFill>
@@ -4003,7 +3784,7 @@
           <a:p>
             <a:pPr algn="ctr"/>
             <a:r>
-              <a:rPr lang="en-US" sz="1600" dirty="0" smtClean="0">
+              <a:rPr lang="en-US" sz="1600" dirty="0">
                 <a:solidFill>
                   <a:schemeClr val="bg1"/>
                 </a:solidFill>
@@ -4165,10 +3946,9 @@
           <a:lstStyle/>
           <a:p>
             <a:r>
-              <a:rPr lang="en-US" sz="1400" dirty="0" smtClean="0"/>
+              <a:rPr lang="en-US" sz="1400" dirty="0"/>
               <a:t>delete 1</a:t>
             </a:r>
-            <a:endParaRPr lang="en-US" sz="1400" dirty="0"/>
           </a:p>
         </p:txBody>
       </p:sp>
@@ -4231,18 +4011,13 @@
           <a:lstStyle/>
           <a:p>
             <a:r>
-              <a:rPr lang="en-US" sz="1400" dirty="0" smtClean="0">
+              <a:rPr lang="en-US" sz="1400" dirty="0">
                 <a:solidFill>
                   <a:srgbClr val="0070C0"/>
                 </a:solidFill>
               </a:rPr>
               <a:t>execute(“delete 1”)</a:t>
             </a:r>
-            <a:endParaRPr lang="en-US" sz="1400" dirty="0">
-              <a:solidFill>
-                <a:srgbClr val="0070C0"/>
-              </a:solidFill>
-            </a:endParaRPr>
           </a:p>
         </p:txBody>
       </p:sp>
@@ -4305,26 +4080,29 @@
           <a:lstStyle/>
           <a:p>
             <a:r>
-              <a:rPr lang="en-US" sz="1400" dirty="0" err="1" smtClean="0">
+              <a:rPr lang="en-US" sz="1400" dirty="0" err="1">
                 <a:solidFill>
                   <a:srgbClr val="7030A0"/>
                 </a:solidFill>
               </a:rPr>
-              <a:t>deletePerson</a:t>
-            </a:r>
-            <a:r>
-              <a:rPr lang="en-US" sz="1400" dirty="0" smtClean="0">
+              <a:t>deleteT</a:t>
+            </a:r>
+            <a:r>
+              <a:rPr lang="en-US" altLang="zh-CN" sz="1400" dirty="0" err="1">
                 <a:solidFill>
                   <a:srgbClr val="7030A0"/>
                 </a:solidFill>
               </a:rPr>
-              <a:t>(p)</a:t>
-            </a:r>
-            <a:endParaRPr lang="en-US" sz="1400" dirty="0">
-              <a:solidFill>
-                <a:srgbClr val="7030A0"/>
-              </a:solidFill>
-            </a:endParaRPr>
+              <a:t>ask</a:t>
+            </a:r>
+            <a:r>
+              <a:rPr lang="en-US" sz="1400" dirty="0">
+                <a:solidFill>
+                  <a:srgbClr val="7030A0"/>
+                </a:solidFill>
+              </a:rPr>
+              <a:t>(t)</a:t>
+            </a:r>
           </a:p>
         </p:txBody>
       </p:sp>
@@ -4351,7 +4129,7 @@
           <a:lstStyle/>
           <a:p>
             <a:r>
-              <a:rPr lang="en-US" sz="1400" dirty="0" smtClean="0">
+              <a:rPr lang="en-US" sz="1400" dirty="0">
                 <a:solidFill>
                   <a:schemeClr val="accent5">
                     <a:lumMod val="75000"/>
@@ -4361,17 +4139,17 @@
               <a:t>post(</a:t>
             </a:r>
             <a:r>
-              <a:rPr lang="en-US" sz="1400" dirty="0" err="1" smtClean="0">
+              <a:rPr lang="en-US" sz="1400" dirty="0" err="1">
                 <a:solidFill>
                   <a:schemeClr val="accent5">
                     <a:lumMod val="75000"/>
                   </a:schemeClr>
                 </a:solidFill>
               </a:rPr>
-              <a:t>AddressBookChangedEvent</a:t>
-            </a:r>
-            <a:r>
-              <a:rPr lang="en-US" sz="1400" dirty="0" smtClean="0">
+              <a:t>TickTaskChangedEvent</a:t>
+            </a:r>
+            <a:r>
+              <a:rPr lang="en-US" sz="1400" dirty="0">
                 <a:solidFill>
                   <a:schemeClr val="accent5">
                     <a:lumMod val="75000"/>
@@ -4380,13 +4158,6 @@
               </a:rPr>
               <a:t>)</a:t>
             </a:r>
-            <a:endParaRPr lang="en-US" sz="1400" dirty="0">
-              <a:solidFill>
-                <a:schemeClr val="accent5">
-                  <a:lumMod val="75000"/>
-                </a:schemeClr>
-              </a:solidFill>
-            </a:endParaRPr>
           </a:p>
         </p:txBody>
       </p:sp>
@@ -4552,7 +4323,7 @@
           <a:p>
             <a:pPr algn="ctr"/>
             <a:r>
-              <a:rPr lang="en-US" sz="1600" dirty="0" smtClean="0">
+              <a:rPr lang="en-US" sz="1600" dirty="0">
                 <a:solidFill>
                   <a:schemeClr val="bg1"/>
                 </a:solidFill>
@@ -4560,7 +4331,7 @@
               <a:t>:</a:t>
             </a:r>
             <a:r>
-              <a:rPr lang="en-US" sz="1600" dirty="0" err="1" smtClean="0">
+              <a:rPr lang="en-US" sz="1600" dirty="0" err="1">
                 <a:solidFill>
                   <a:schemeClr val="bg1"/>
                 </a:solidFill>
@@ -4793,7 +4564,7 @@
           <a:p>
             <a:pPr algn="ctr"/>
             <a:r>
-              <a:rPr lang="en-US" sz="1600" dirty="0" smtClean="0">
+              <a:rPr lang="en-US" sz="1600" dirty="0">
                 <a:solidFill>
                   <a:schemeClr val="bg1"/>
                 </a:solidFill>
@@ -4925,7 +4696,7 @@
           <a:lstStyle/>
           <a:p>
             <a:r>
-              <a:rPr lang="en-US" sz="1400" dirty="0" smtClean="0">
+              <a:rPr lang="en-US" sz="1400" dirty="0">
                 <a:solidFill>
                   <a:schemeClr val="accent5">
                     <a:lumMod val="75000"/>
@@ -4935,17 +4706,17 @@
               <a:t>post(</a:t>
             </a:r>
             <a:r>
-              <a:rPr lang="en-US" sz="1400" dirty="0" err="1" smtClean="0">
+              <a:rPr lang="en-US" sz="1400" dirty="0" err="1">
                 <a:solidFill>
                   <a:schemeClr val="accent5">
                     <a:lumMod val="75000"/>
                   </a:schemeClr>
                 </a:solidFill>
               </a:rPr>
-              <a:t>AddressBookChangedEvent</a:t>
-            </a:r>
-            <a:r>
-              <a:rPr lang="en-US" sz="1400" dirty="0" smtClean="0">
+              <a:t>TickTaskChangedEvent</a:t>
+            </a:r>
+            <a:r>
+              <a:rPr lang="en-US" sz="1400" dirty="0">
                 <a:solidFill>
                   <a:schemeClr val="accent5">
                     <a:lumMod val="75000"/>
@@ -4954,13 +4725,6 @@
               </a:rPr>
               <a:t>)</a:t>
             </a:r>
-            <a:endParaRPr lang="en-US" sz="1400" dirty="0">
-              <a:solidFill>
-                <a:schemeClr val="accent5">
-                  <a:lumMod val="75000"/>
-                </a:schemeClr>
-              </a:solidFill>
-            </a:endParaRPr>
           </a:p>
         </p:txBody>
       </p:sp>
@@ -5052,7 +4816,7 @@
           <a:p>
             <a:pPr algn="ctr"/>
             <a:r>
-              <a:rPr lang="en-US" sz="1600" dirty="0" smtClean="0">
+              <a:rPr lang="en-US" sz="1600" dirty="0">
                 <a:solidFill>
                   <a:schemeClr val="bg1"/>
                 </a:solidFill>
@@ -5060,7 +4824,7 @@
               <a:t>:</a:t>
             </a:r>
             <a:r>
-              <a:rPr lang="en-US" sz="1600" dirty="0" err="1" smtClean="0">
+              <a:rPr lang="en-US" sz="1600" dirty="0" err="1">
                 <a:solidFill>
                   <a:schemeClr val="bg1"/>
                 </a:solidFill>
@@ -5307,17 +5071,17 @@
           <a:lstStyle/>
           <a:p>
             <a:r>
-              <a:rPr lang="en-US" sz="1400" dirty="0" err="1" smtClean="0">
+              <a:rPr lang="en-US" sz="1400" dirty="0" err="1">
                 <a:solidFill>
                   <a:schemeClr val="accent6">
                     <a:lumMod val="75000"/>
                   </a:schemeClr>
                 </a:solidFill>
               </a:rPr>
-              <a:t>handleAddresssBookChangedEvent</a:t>
-            </a:r>
-            <a:r>
-              <a:rPr lang="en-US" sz="1400" dirty="0" smtClean="0">
+              <a:t>handleTickTaskChangedEvent</a:t>
+            </a:r>
+            <a:r>
+              <a:rPr lang="en-US" sz="1400" dirty="0">
                 <a:solidFill>
                   <a:schemeClr val="accent6">
                     <a:lumMod val="75000"/>
@@ -5326,13 +5090,6 @@
               </a:rPr>
               <a:t>()</a:t>
             </a:r>
-            <a:endParaRPr lang="en-US" sz="1400" dirty="0">
-              <a:solidFill>
-                <a:schemeClr val="accent6">
-                  <a:lumMod val="75000"/>
-                </a:schemeClr>
-              </a:solidFill>
-            </a:endParaRPr>
           </a:p>
         </p:txBody>
       </p:sp>
@@ -5417,7 +5174,7 @@
           <a:p>
             <a:pPr algn="ctr"/>
             <a:r>
-              <a:rPr lang="en-US" sz="1600" dirty="0" smtClean="0">
+              <a:rPr lang="en-US" sz="1600" dirty="0">
                 <a:solidFill>
                   <a:schemeClr val="bg1"/>
                 </a:solidFill>
@@ -5620,26 +5377,21 @@
           <a:lstStyle/>
           <a:p>
             <a:r>
-              <a:rPr lang="en-US" sz="1400" dirty="0" err="1" smtClean="0">
+              <a:rPr lang="en-US" sz="1400" dirty="0" err="1">
                 <a:solidFill>
                   <a:srgbClr val="00B050"/>
                 </a:solidFill>
               </a:rPr>
-              <a:t>handleAddresssBookChangedEvent</a:t>
-            </a:r>
-            <a:r>
-              <a:rPr lang="en-US" sz="1400" dirty="0" smtClean="0">
+              <a:t>handleTickTaskChangedEvent</a:t>
+            </a:r>
+            <a:r>
+              <a:rPr lang="en-US" sz="1400" dirty="0">
                 <a:solidFill>
                   <a:srgbClr val="00B050"/>
                 </a:solidFill>
               </a:rPr>
               <a:t>()</a:t>
             </a:r>
-            <a:endParaRPr lang="en-US" sz="1400" dirty="0">
-              <a:solidFill>
-                <a:srgbClr val="00B050"/>
-              </a:solidFill>
-            </a:endParaRPr>
           </a:p>
         </p:txBody>
       </p:sp>
@@ -5826,18 +5578,13 @@
           <a:p>
             <a:pPr algn="r"/>
             <a:r>
-              <a:rPr lang="en-US" sz="1400" dirty="0" smtClean="0">
+              <a:rPr lang="en-US" sz="1400" dirty="0">
                 <a:solidFill>
                   <a:srgbClr val="00B050"/>
                 </a:solidFill>
               </a:rPr>
               <a:t>Update status bar</a:t>
             </a:r>
-            <a:endParaRPr lang="en-US" sz="1400" dirty="0">
-              <a:solidFill>
-                <a:srgbClr val="00B050"/>
-              </a:solidFill>
-            </a:endParaRPr>
           </a:p>
         </p:txBody>
       </p:sp>
@@ -6027,7 +5774,7 @@
           <a:lstStyle/>
           <a:p>
             <a:r>
-              <a:rPr lang="en-US" sz="1400" dirty="0" smtClean="0">
+              <a:rPr lang="en-US" sz="1400" dirty="0">
                 <a:solidFill>
                   <a:schemeClr val="accent6">
                     <a:lumMod val="75000"/>
@@ -6037,7 +5784,7 @@
               <a:t>Save </a:t>
             </a:r>
             <a:br>
-              <a:rPr lang="en-US" sz="1400" dirty="0" smtClean="0">
+              <a:rPr lang="en-US" sz="1400" dirty="0">
                 <a:solidFill>
                   <a:schemeClr val="accent6">
                     <a:lumMod val="75000"/>
@@ -6046,7 +5793,7 @@
               </a:rPr>
             </a:br>
             <a:r>
-              <a:rPr lang="en-US" sz="1400" dirty="0" smtClean="0">
+              <a:rPr lang="en-US" sz="1400" dirty="0">
                 <a:solidFill>
                   <a:schemeClr val="accent6">
                     <a:lumMod val="75000"/>
@@ -6055,13 +5802,60 @@
               </a:rPr>
               <a:t>to file</a:t>
             </a:r>
-            <a:endParaRPr lang="en-US" sz="1400" dirty="0">
-              <a:solidFill>
-                <a:schemeClr val="accent6">
-                  <a:lumMod val="75000"/>
-                </a:schemeClr>
-              </a:solidFill>
-            </a:endParaRPr>
+          </a:p>
+        </p:txBody>
+      </p:sp>
+      <p:sp>
+        <p:nvSpPr>
+          <p:cNvPr id="4" name="Rectangle 3">
+            <a:extLst>
+              <a:ext uri="{FF2B5EF4-FFF2-40B4-BE49-F238E27FC236}">
+                <a16:creationId xmlns:a16="http://schemas.microsoft.com/office/drawing/2014/main" id="{7560313A-C68D-4003-AAE4-2DFA745DCD8D}"/>
+              </a:ext>
+            </a:extLst>
+          </p:cNvPr>
+          <p:cNvSpPr/>
+          <p:nvPr/>
+        </p:nvSpPr>
+        <p:spPr>
+          <a:xfrm>
+            <a:off x="-45512" y="617113"/>
+            <a:ext cx="829137" cy="523220"/>
+          </a:xfrm>
+          <a:prstGeom prst="rect">
+            <a:avLst/>
+          </a:prstGeom>
+          <a:noFill/>
+        </p:spPr>
+        <p:txBody>
+          <a:bodyPr wrap="none" lIns="91440" tIns="45720" rIns="91440" bIns="45720">
+            <a:spAutoFit/>
+          </a:bodyPr>
+          <a:lstStyle/>
+          <a:p>
+            <a:pPr algn="ctr"/>
+            <a:r>
+              <a:rPr lang="en-US" sz="2800" b="1" cap="none" spc="0" dirty="0">
+                <a:ln w="9525">
+                  <a:solidFill>
+                    <a:schemeClr val="bg1"/>
+                  </a:solidFill>
+                  <a:prstDash val="solid"/>
+                </a:ln>
+                <a:solidFill>
+                  <a:schemeClr val="accent5"/>
+                </a:solidFill>
+                <a:effectLst>
+                  <a:outerShdw blurRad="12700" dist="38100" dir="2700000" algn="tl" rotWithShape="0">
+                    <a:schemeClr val="accent5">
+                      <a:lumMod val="60000"/>
+                      <a:lumOff val="40000"/>
+                    </a:schemeClr>
+                  </a:outerShdw>
+                </a:effectLst>
+              </a:rPr>
+              <a:t>Task</a:t>
+            </a:r>
           </a:p>
         </p:txBody>
       </p:sp>

</xml_diff>